<commit_message>
Update Slide Đồ án tốt nghiệp_Nguyễn Tuấn Anh_REV1.pptx
</commit_message>
<xml_diff>
--- a/documents/Slide Đồ án tốt nghiệp_Nguyễn Tuấn Anh_REV1.pptx
+++ b/documents/Slide Đồ án tốt nghiệp_Nguyễn Tuấn Anh_REV1.pptx
@@ -258,7 +258,7 @@
           <a:p>
             <a:fld id="{C8EC4C12-44DC-4AF1-91BC-D6BFF5E34312}" type="datetimeFigureOut">
               <a:rPr lang="vi-VN" smtClean="0"/>
-              <a:t>27/01/2021</a:t>
+              <a:t>28/01/2021</a:t>
             </a:fld>
             <a:endParaRPr lang="vi-VN"/>
           </a:p>
@@ -570,7 +570,41 @@
           <a:bodyPr/>
           <a:lstStyle/>
           <a:p>
-            <a:endParaRPr lang="en-US" dirty="0"/>
+            <a:pPr marL="171450" indent="-171450">
+              <a:buFontTx/>
+              <a:buChar char="-"/>
+            </a:pPr>
+            <a:r>
+              <a:rPr lang="en-US"/>
+              <a:t>Chào thầy cô và các bạn, đến với buổi bảo vệ tốt nghiêp</a:t>
+            </a:r>
+          </a:p>
+          <a:p>
+            <a:pPr marL="171450" indent="-171450">
+              <a:buFontTx/>
+              <a:buChar char="-"/>
+            </a:pPr>
+            <a:r>
+              <a:rPr lang="en-US"/>
+              <a:t>Tên, mssv, lớp</a:t>
+            </a:r>
+          </a:p>
+          <a:p>
+            <a:pPr marL="171450" indent="-171450">
+              <a:buFontTx/>
+              <a:buChar char="-"/>
+            </a:pPr>
+            <a:r>
+              <a:rPr lang="en-US"/>
+              <a:t>dưới sự hướng dẫn của thầy Nguyễn Văn Ánh thực hiện đề tài: </a:t>
+            </a:r>
+          </a:p>
+          <a:p>
+            <a:pPr marL="171450" indent="-171450">
+              <a:buFontTx/>
+              <a:buChar char="-"/>
+            </a:pPr>
+            <a:endParaRPr lang="vi-VN"/>
           </a:p>
         </p:txBody>
       </p:sp>
@@ -591,7 +625,7 @@
           <a:p>
             <a:fld id="{E2C07920-3A74-449B-970D-FA3232CC8EC0}" type="slidenum">
               <a:rPr lang="vi-VN" smtClean="0"/>
-              <a:t>9</a:t>
+              <a:t>2</a:t>
             </a:fld>
             <a:endParaRPr lang="vi-VN"/>
           </a:p>
@@ -600,7 +634,7 @@
     </p:spTree>
     <p:extLst>
       <p:ext uri="{BB962C8B-B14F-4D97-AF65-F5344CB8AC3E}">
-        <p14:creationId xmlns:p14="http://schemas.microsoft.com/office/powerpoint/2010/main" val="4104785786"/>
+        <p14:creationId xmlns:p14="http://schemas.microsoft.com/office/powerpoint/2010/main" val="2962263286"/>
       </p:ext>
     </p:extLst>
   </p:cSld>
@@ -610,7 +644,273 @@
 </p:notes>
 </file>
 
-<file path=ppt/notesSlides/notesSlide2.xml><?xml version="1.0" encoding="utf-8"?>
+<file path=ppt/notesSlides/notesSlide10.xml><?xml version="1.0" encoding="utf-8"?>
+<p:notes xmlns:a="http://schemas.openxmlformats.org/drawingml/2006/main" xmlns:r="http://schemas.openxmlformats.org/officeDocument/2006/relationships" xmlns:p="http://schemas.openxmlformats.org/presentationml/2006/main">
+  <p:cSld>
+    <p:spTree>
+      <p:nvGrpSpPr>
+        <p:cNvPr id="1" name=""/>
+        <p:cNvGrpSpPr/>
+        <p:nvPr/>
+      </p:nvGrpSpPr>
+      <p:grpSpPr>
+        <a:xfrm>
+          <a:off x="0" y="0"/>
+          <a:ext cx="0" cy="0"/>
+          <a:chOff x="0" y="0"/>
+          <a:chExt cx="0" cy="0"/>
+        </a:xfrm>
+      </p:grpSpPr>
+      <p:sp>
+        <p:nvSpPr>
+          <p:cNvPr id="2" name="Slide Image Placeholder 1"/>
+          <p:cNvSpPr>
+            <a:spLocks noGrp="1" noRot="1" noChangeAspect="1"/>
+          </p:cNvSpPr>
+          <p:nvPr>
+            <p:ph type="sldImg"/>
+          </p:nvPr>
+        </p:nvSpPr>
+        <p:spPr/>
+      </p:sp>
+      <p:sp>
+        <p:nvSpPr>
+          <p:cNvPr id="3" name="Notes Placeholder 2"/>
+          <p:cNvSpPr>
+            <a:spLocks noGrp="1"/>
+          </p:cNvSpPr>
+          <p:nvPr>
+            <p:ph type="body" idx="1"/>
+          </p:nvPr>
+        </p:nvSpPr>
+        <p:spPr/>
+        <p:txBody>
+          <a:bodyPr/>
+          <a:lstStyle/>
+          <a:p>
+            <a:endParaRPr lang="vi-VN"/>
+          </a:p>
+        </p:txBody>
+      </p:sp>
+      <p:sp>
+        <p:nvSpPr>
+          <p:cNvPr id="4" name="Slide Number Placeholder 3"/>
+          <p:cNvSpPr>
+            <a:spLocks noGrp="1"/>
+          </p:cNvSpPr>
+          <p:nvPr>
+            <p:ph type="sldNum" sz="quarter" idx="5"/>
+          </p:nvPr>
+        </p:nvSpPr>
+        <p:spPr/>
+        <p:txBody>
+          <a:bodyPr/>
+          <a:lstStyle/>
+          <a:p>
+            <a:fld id="{E2C07920-3A74-449B-970D-FA3232CC8EC0}" type="slidenum">
+              <a:rPr lang="vi-VN" smtClean="0"/>
+              <a:t>11</a:t>
+            </a:fld>
+            <a:endParaRPr lang="vi-VN"/>
+          </a:p>
+        </p:txBody>
+      </p:sp>
+    </p:spTree>
+    <p:extLst>
+      <p:ext uri="{BB962C8B-B14F-4D97-AF65-F5344CB8AC3E}">
+        <p14:creationId xmlns:p14="http://schemas.microsoft.com/office/powerpoint/2010/main" val="548883278"/>
+      </p:ext>
+    </p:extLst>
+  </p:cSld>
+  <p:clrMapOvr>
+    <a:masterClrMapping/>
+  </p:clrMapOvr>
+</p:notes>
+</file>
+
+<file path=ppt/notesSlides/notesSlide11.xml><?xml version="1.0" encoding="utf-8"?>
+<p:notes xmlns:a="http://schemas.openxmlformats.org/drawingml/2006/main" xmlns:r="http://schemas.openxmlformats.org/officeDocument/2006/relationships" xmlns:p="http://schemas.openxmlformats.org/presentationml/2006/main">
+  <p:cSld>
+    <p:spTree>
+      <p:nvGrpSpPr>
+        <p:cNvPr id="1" name=""/>
+        <p:cNvGrpSpPr/>
+        <p:nvPr/>
+      </p:nvGrpSpPr>
+      <p:grpSpPr>
+        <a:xfrm>
+          <a:off x="0" y="0"/>
+          <a:ext cx="0" cy="0"/>
+          <a:chOff x="0" y="0"/>
+          <a:chExt cx="0" cy="0"/>
+        </a:xfrm>
+      </p:grpSpPr>
+      <p:sp>
+        <p:nvSpPr>
+          <p:cNvPr id="2" name="Slide Image Placeholder 1"/>
+          <p:cNvSpPr>
+            <a:spLocks noGrp="1" noRot="1" noChangeAspect="1"/>
+          </p:cNvSpPr>
+          <p:nvPr>
+            <p:ph type="sldImg"/>
+          </p:nvPr>
+        </p:nvSpPr>
+        <p:spPr/>
+      </p:sp>
+      <p:sp>
+        <p:nvSpPr>
+          <p:cNvPr id="3" name="Notes Placeholder 2"/>
+          <p:cNvSpPr>
+            <a:spLocks noGrp="1"/>
+          </p:cNvSpPr>
+          <p:nvPr>
+            <p:ph type="body" idx="1"/>
+          </p:nvPr>
+        </p:nvSpPr>
+        <p:spPr/>
+        <p:txBody>
+          <a:bodyPr/>
+          <a:lstStyle/>
+          <a:p>
+            <a:r>
+              <a:rPr lang="en-US"/>
+              <a:t>Khối đóng cắt gồm 2 linh kiện chính moc, bta</a:t>
+            </a:r>
+          </a:p>
+          <a:p>
+            <a:r>
+              <a:rPr lang="en-US"/>
+              <a:t>Điều khiển đóng cắt thông qua chân vi điều khiển. Khi tín hiệu điều khiển ở mức cao, có dòng điện chảy qua …</a:t>
+            </a:r>
+            <a:endParaRPr lang="vi-VN"/>
+          </a:p>
+        </p:txBody>
+      </p:sp>
+      <p:sp>
+        <p:nvSpPr>
+          <p:cNvPr id="4" name="Slide Number Placeholder 3"/>
+          <p:cNvSpPr>
+            <a:spLocks noGrp="1"/>
+          </p:cNvSpPr>
+          <p:nvPr>
+            <p:ph type="sldNum" sz="quarter" idx="5"/>
+          </p:nvPr>
+        </p:nvSpPr>
+        <p:spPr/>
+        <p:txBody>
+          <a:bodyPr/>
+          <a:lstStyle/>
+          <a:p>
+            <a:fld id="{E2C07920-3A74-449B-970D-FA3232CC8EC0}" type="slidenum">
+              <a:rPr lang="vi-VN" smtClean="0"/>
+              <a:t>12</a:t>
+            </a:fld>
+            <a:endParaRPr lang="vi-VN"/>
+          </a:p>
+        </p:txBody>
+      </p:sp>
+    </p:spTree>
+    <p:extLst>
+      <p:ext uri="{BB962C8B-B14F-4D97-AF65-F5344CB8AC3E}">
+        <p14:creationId xmlns:p14="http://schemas.microsoft.com/office/powerpoint/2010/main" val="641138283"/>
+      </p:ext>
+    </p:extLst>
+  </p:cSld>
+  <p:clrMapOvr>
+    <a:masterClrMapping/>
+  </p:clrMapOvr>
+</p:notes>
+</file>
+
+<file path=ppt/notesSlides/notesSlide12.xml><?xml version="1.0" encoding="utf-8"?>
+<p:notes xmlns:a="http://schemas.openxmlformats.org/drawingml/2006/main" xmlns:r="http://schemas.openxmlformats.org/officeDocument/2006/relationships" xmlns:p="http://schemas.openxmlformats.org/presentationml/2006/main">
+  <p:cSld>
+    <p:spTree>
+      <p:nvGrpSpPr>
+        <p:cNvPr id="1" name=""/>
+        <p:cNvGrpSpPr/>
+        <p:nvPr/>
+      </p:nvGrpSpPr>
+      <p:grpSpPr>
+        <a:xfrm>
+          <a:off x="0" y="0"/>
+          <a:ext cx="0" cy="0"/>
+          <a:chOff x="0" y="0"/>
+          <a:chExt cx="0" cy="0"/>
+        </a:xfrm>
+      </p:grpSpPr>
+      <p:sp>
+        <p:nvSpPr>
+          <p:cNvPr id="2" name="Slide Image Placeholder 1"/>
+          <p:cNvSpPr>
+            <a:spLocks noGrp="1" noRot="1" noChangeAspect="1"/>
+          </p:cNvSpPr>
+          <p:nvPr>
+            <p:ph type="sldImg"/>
+          </p:nvPr>
+        </p:nvSpPr>
+        <p:spPr/>
+      </p:sp>
+      <p:sp>
+        <p:nvSpPr>
+          <p:cNvPr id="3" name="Notes Placeholder 2"/>
+          <p:cNvSpPr>
+            <a:spLocks noGrp="1"/>
+          </p:cNvSpPr>
+          <p:nvPr>
+            <p:ph type="body" idx="1"/>
+          </p:nvPr>
+        </p:nvSpPr>
+        <p:spPr/>
+        <p:txBody>
+          <a:bodyPr/>
+          <a:lstStyle/>
+          <a:p>
+            <a:r>
+              <a:rPr lang="en-US"/>
+              <a:t>Khối nút nhấn gồm </a:t>
+            </a:r>
+            <a:endParaRPr lang="vi-VN"/>
+          </a:p>
+        </p:txBody>
+      </p:sp>
+      <p:sp>
+        <p:nvSpPr>
+          <p:cNvPr id="4" name="Slide Number Placeholder 3"/>
+          <p:cNvSpPr>
+            <a:spLocks noGrp="1"/>
+          </p:cNvSpPr>
+          <p:nvPr>
+            <p:ph type="sldNum" sz="quarter" idx="5"/>
+          </p:nvPr>
+        </p:nvSpPr>
+        <p:spPr/>
+        <p:txBody>
+          <a:bodyPr/>
+          <a:lstStyle/>
+          <a:p>
+            <a:fld id="{E2C07920-3A74-449B-970D-FA3232CC8EC0}" type="slidenum">
+              <a:rPr lang="vi-VN" smtClean="0"/>
+              <a:t>13</a:t>
+            </a:fld>
+            <a:endParaRPr lang="vi-VN"/>
+          </a:p>
+        </p:txBody>
+      </p:sp>
+    </p:spTree>
+    <p:extLst>
+      <p:ext uri="{BB962C8B-B14F-4D97-AF65-F5344CB8AC3E}">
+        <p14:creationId xmlns:p14="http://schemas.microsoft.com/office/powerpoint/2010/main" val="3396904474"/>
+      </p:ext>
+    </p:extLst>
+  </p:cSld>
+  <p:clrMapOvr>
+    <a:masterClrMapping/>
+  </p:clrMapOvr>
+</p:notes>
+</file>
+
+<file path=ppt/notesSlides/notesSlide13.xml><?xml version="1.0" encoding="utf-8"?>
 <p:notes xmlns:a="http://schemas.openxmlformats.org/drawingml/2006/main" xmlns:r="http://schemas.openxmlformats.org/officeDocument/2006/relationships" xmlns:p="http://schemas.openxmlformats.org/presentationml/2006/main">
   <p:cSld>
     <p:spTree>
@@ -694,7 +994,7 @@
 </p:notes>
 </file>
 
-<file path=ppt/notesSlides/notesSlide3.xml><?xml version="1.0" encoding="utf-8"?>
+<file path=ppt/notesSlides/notesSlide14.xml><?xml version="1.0" encoding="utf-8"?>
 <p:notes xmlns:a="http://schemas.openxmlformats.org/drawingml/2006/main" xmlns:r="http://schemas.openxmlformats.org/officeDocument/2006/relationships" xmlns:p="http://schemas.openxmlformats.org/presentationml/2006/main">
   <p:cSld>
     <p:spTree>
@@ -738,6 +1038,10 @@
           <a:bodyPr/>
           <a:lstStyle/>
           <a:p>
+            <a:r>
+              <a:rPr lang="en-US"/>
+              <a:t>Thêm màn hình cấu hình wifi</a:t>
+            </a:r>
             <a:endParaRPr lang="vi-VN"/>
           </a:p>
         </p:txBody>
@@ -778,7 +1082,7 @@
 </p:notes>
 </file>
 
-<file path=ppt/notesSlides/notesSlide4.xml><?xml version="1.0" encoding="utf-8"?>
+<file path=ppt/notesSlides/notesSlide15.xml><?xml version="1.0" encoding="utf-8"?>
 <p:notes xmlns:a="http://schemas.openxmlformats.org/drawingml/2006/main" xmlns:r="http://schemas.openxmlformats.org/officeDocument/2006/relationships" xmlns:p="http://schemas.openxmlformats.org/presentationml/2006/main">
   <p:cSld>
     <p:spTree>
@@ -862,7 +1166,7 @@
 </p:notes>
 </file>
 
-<file path=ppt/notesSlides/notesSlide5.xml><?xml version="1.0" encoding="utf-8"?>
+<file path=ppt/notesSlides/notesSlide16.xml><?xml version="1.0" encoding="utf-8"?>
 <p:notes xmlns:a="http://schemas.openxmlformats.org/drawingml/2006/main" xmlns:r="http://schemas.openxmlformats.org/officeDocument/2006/relationships" xmlns:p="http://schemas.openxmlformats.org/presentationml/2006/main">
   <p:cSld>
     <p:spTree>
@@ -937,6 +1241,858 @@
     <p:extLst>
       <p:ext uri="{BB962C8B-B14F-4D97-AF65-F5344CB8AC3E}">
         <p14:creationId xmlns:p14="http://schemas.microsoft.com/office/powerpoint/2010/main" val="555518452"/>
+      </p:ext>
+    </p:extLst>
+  </p:cSld>
+  <p:clrMapOvr>
+    <a:masterClrMapping/>
+  </p:clrMapOvr>
+</p:notes>
+</file>
+
+<file path=ppt/notesSlides/notesSlide2.xml><?xml version="1.0" encoding="utf-8"?>
+<p:notes xmlns:a="http://schemas.openxmlformats.org/drawingml/2006/main" xmlns:r="http://schemas.openxmlformats.org/officeDocument/2006/relationships" xmlns:p="http://schemas.openxmlformats.org/presentationml/2006/main">
+  <p:cSld>
+    <p:spTree>
+      <p:nvGrpSpPr>
+        <p:cNvPr id="1" name=""/>
+        <p:cNvGrpSpPr/>
+        <p:nvPr/>
+      </p:nvGrpSpPr>
+      <p:grpSpPr>
+        <a:xfrm>
+          <a:off x="0" y="0"/>
+          <a:ext cx="0" cy="0"/>
+          <a:chOff x="0" y="0"/>
+          <a:chExt cx="0" cy="0"/>
+        </a:xfrm>
+      </p:grpSpPr>
+      <p:sp>
+        <p:nvSpPr>
+          <p:cNvPr id="2" name="Slide Image Placeholder 1"/>
+          <p:cNvSpPr>
+            <a:spLocks noGrp="1" noRot="1" noChangeAspect="1"/>
+          </p:cNvSpPr>
+          <p:nvPr>
+            <p:ph type="sldImg"/>
+          </p:nvPr>
+        </p:nvSpPr>
+        <p:spPr/>
+      </p:sp>
+      <p:sp>
+        <p:nvSpPr>
+          <p:cNvPr id="3" name="Notes Placeholder 2"/>
+          <p:cNvSpPr>
+            <a:spLocks noGrp="1"/>
+          </p:cNvSpPr>
+          <p:nvPr>
+            <p:ph type="body" idx="1"/>
+          </p:nvPr>
+        </p:nvSpPr>
+        <p:spPr/>
+        <p:txBody>
+          <a:bodyPr/>
+          <a:lstStyle/>
+          <a:p>
+            <a:pPr marL="171450" indent="-171450">
+              <a:buFontTx/>
+              <a:buChar char="-"/>
+            </a:pPr>
+            <a:r>
+              <a:rPr lang="en-US"/>
+              <a:t>Trong báo cáo ngày hôm nay em xin trình bày những nội dung sau</a:t>
+            </a:r>
+          </a:p>
+          <a:p>
+            <a:pPr marL="171450" indent="-171450">
+              <a:buFontTx/>
+              <a:buChar char="-"/>
+            </a:pPr>
+            <a:r>
+              <a:rPr lang="en-US"/>
+              <a:t>Đầu tiên</a:t>
+            </a:r>
+          </a:p>
+          <a:p>
+            <a:pPr marL="171450" indent="-171450">
+              <a:buFontTx/>
+              <a:buChar char="-"/>
+            </a:pPr>
+            <a:r>
+              <a:rPr lang="en-US"/>
+              <a:t>Tiếp theo</a:t>
+            </a:r>
+          </a:p>
+          <a:p>
+            <a:pPr marL="171450" indent="-171450">
+              <a:buFontTx/>
+              <a:buChar char="-"/>
+            </a:pPr>
+            <a:r>
+              <a:rPr lang="en-US"/>
+              <a:t>Từ thiết kế trên</a:t>
+            </a:r>
+          </a:p>
+          <a:p>
+            <a:pPr marL="171450" indent="-171450">
+              <a:buFontTx/>
+              <a:buChar char="-"/>
+            </a:pPr>
+            <a:r>
+              <a:rPr lang="en-US"/>
+              <a:t>Cuối cùng</a:t>
+            </a:r>
+            <a:endParaRPr lang="vi-VN"/>
+          </a:p>
+        </p:txBody>
+      </p:sp>
+      <p:sp>
+        <p:nvSpPr>
+          <p:cNvPr id="4" name="Slide Number Placeholder 3"/>
+          <p:cNvSpPr>
+            <a:spLocks noGrp="1"/>
+          </p:cNvSpPr>
+          <p:nvPr>
+            <p:ph type="sldNum" sz="quarter" idx="5"/>
+          </p:nvPr>
+        </p:nvSpPr>
+        <p:spPr/>
+        <p:txBody>
+          <a:bodyPr/>
+          <a:lstStyle/>
+          <a:p>
+            <a:fld id="{E2C07920-3A74-449B-970D-FA3232CC8EC0}" type="slidenum">
+              <a:rPr lang="vi-VN" smtClean="0"/>
+              <a:t>3</a:t>
+            </a:fld>
+            <a:endParaRPr lang="vi-VN"/>
+          </a:p>
+        </p:txBody>
+      </p:sp>
+    </p:spTree>
+    <p:extLst>
+      <p:ext uri="{BB962C8B-B14F-4D97-AF65-F5344CB8AC3E}">
+        <p14:creationId xmlns:p14="http://schemas.microsoft.com/office/powerpoint/2010/main" val="2768355779"/>
+      </p:ext>
+    </p:extLst>
+  </p:cSld>
+  <p:clrMapOvr>
+    <a:masterClrMapping/>
+  </p:clrMapOvr>
+</p:notes>
+</file>
+
+<file path=ppt/notesSlides/notesSlide3.xml><?xml version="1.0" encoding="utf-8"?>
+<p:notes xmlns:a="http://schemas.openxmlformats.org/drawingml/2006/main" xmlns:r="http://schemas.openxmlformats.org/officeDocument/2006/relationships" xmlns:p="http://schemas.openxmlformats.org/presentationml/2006/main">
+  <p:cSld>
+    <p:spTree>
+      <p:nvGrpSpPr>
+        <p:cNvPr id="1" name=""/>
+        <p:cNvGrpSpPr/>
+        <p:nvPr/>
+      </p:nvGrpSpPr>
+      <p:grpSpPr>
+        <a:xfrm>
+          <a:off x="0" y="0"/>
+          <a:ext cx="0" cy="0"/>
+          <a:chOff x="0" y="0"/>
+          <a:chExt cx="0" cy="0"/>
+        </a:xfrm>
+      </p:grpSpPr>
+      <p:sp>
+        <p:nvSpPr>
+          <p:cNvPr id="2" name="Slide Image Placeholder 1"/>
+          <p:cNvSpPr>
+            <a:spLocks noGrp="1" noRot="1" noChangeAspect="1"/>
+          </p:cNvSpPr>
+          <p:nvPr>
+            <p:ph type="sldImg"/>
+          </p:nvPr>
+        </p:nvSpPr>
+        <p:spPr/>
+      </p:sp>
+      <p:sp>
+        <p:nvSpPr>
+          <p:cNvPr id="3" name="Notes Placeholder 2"/>
+          <p:cNvSpPr>
+            <a:spLocks noGrp="1"/>
+          </p:cNvSpPr>
+          <p:nvPr>
+            <p:ph type="body" idx="1"/>
+          </p:nvPr>
+        </p:nvSpPr>
+        <p:spPr/>
+        <p:txBody>
+          <a:bodyPr/>
+          <a:lstStyle/>
+          <a:p>
+            <a:pPr marL="171450" indent="-171450">
+              <a:buFontTx/>
+              <a:buChar char="-"/>
+            </a:pPr>
+            <a:r>
+              <a:rPr lang="en-US"/>
+              <a:t>Lý do chọn đề tài: sử dụng thiết bị điện hang ngày. </a:t>
+            </a:r>
+          </a:p>
+          <a:p>
+            <a:pPr marL="171450" indent="-171450">
+              <a:buFontTx/>
+              <a:buChar char="-"/>
+            </a:pPr>
+            <a:r>
+              <a:rPr lang="en-US"/>
+              <a:t>Các cách đóng cắt trực tiếp</a:t>
+            </a:r>
+          </a:p>
+          <a:p>
+            <a:pPr marL="171450" indent="-171450">
+              <a:buFontTx/>
+              <a:buChar char="-"/>
+            </a:pPr>
+            <a:r>
+              <a:rPr lang="en-US"/>
+              <a:t>Các cách đóng cắt từ xa hiện nay: RF, hồng ngoại, zigbee, Bluetooth</a:t>
+            </a:r>
+          </a:p>
+          <a:p>
+            <a:pPr marL="171450" indent="-171450">
+              <a:buFontTx/>
+              <a:buChar char="-"/>
+            </a:pPr>
+            <a:r>
+              <a:rPr lang="en-US"/>
+              <a:t>Với sự phát triển của mạng internet mở ra cơ hội cho IoT</a:t>
+            </a:r>
+          </a:p>
+          <a:p>
+            <a:pPr marL="0" indent="0">
+              <a:buFontTx/>
+              <a:buNone/>
+            </a:pPr>
+            <a:r>
+              <a:rPr lang="en-US"/>
+              <a:t>-  nhiệm vụ: đóng cắt, truyền thông, ứng dụng điều khiển</a:t>
+            </a:r>
+          </a:p>
+        </p:txBody>
+      </p:sp>
+      <p:sp>
+        <p:nvSpPr>
+          <p:cNvPr id="4" name="Slide Number Placeholder 3"/>
+          <p:cNvSpPr>
+            <a:spLocks noGrp="1"/>
+          </p:cNvSpPr>
+          <p:nvPr>
+            <p:ph type="sldNum" sz="quarter" idx="5"/>
+          </p:nvPr>
+        </p:nvSpPr>
+        <p:spPr/>
+        <p:txBody>
+          <a:bodyPr/>
+          <a:lstStyle/>
+          <a:p>
+            <a:fld id="{E2C07920-3A74-449B-970D-FA3232CC8EC0}" type="slidenum">
+              <a:rPr lang="vi-VN" smtClean="0"/>
+              <a:t>4</a:t>
+            </a:fld>
+            <a:endParaRPr lang="vi-VN"/>
+          </a:p>
+        </p:txBody>
+      </p:sp>
+    </p:spTree>
+    <p:extLst>
+      <p:ext uri="{BB962C8B-B14F-4D97-AF65-F5344CB8AC3E}">
+        <p14:creationId xmlns:p14="http://schemas.microsoft.com/office/powerpoint/2010/main" val="2697840368"/>
+      </p:ext>
+    </p:extLst>
+  </p:cSld>
+  <p:clrMapOvr>
+    <a:masterClrMapping/>
+  </p:clrMapOvr>
+</p:notes>
+</file>
+
+<file path=ppt/notesSlides/notesSlide4.xml><?xml version="1.0" encoding="utf-8"?>
+<p:notes xmlns:a="http://schemas.openxmlformats.org/drawingml/2006/main" xmlns:r="http://schemas.openxmlformats.org/officeDocument/2006/relationships" xmlns:p="http://schemas.openxmlformats.org/presentationml/2006/main">
+  <p:cSld>
+    <p:spTree>
+      <p:nvGrpSpPr>
+        <p:cNvPr id="1" name=""/>
+        <p:cNvGrpSpPr/>
+        <p:nvPr/>
+      </p:nvGrpSpPr>
+      <p:grpSpPr>
+        <a:xfrm>
+          <a:off x="0" y="0"/>
+          <a:ext cx="0" cy="0"/>
+          <a:chOff x="0" y="0"/>
+          <a:chExt cx="0" cy="0"/>
+        </a:xfrm>
+      </p:grpSpPr>
+      <p:sp>
+        <p:nvSpPr>
+          <p:cNvPr id="2" name="Slide Image Placeholder 1"/>
+          <p:cNvSpPr>
+            <a:spLocks noGrp="1" noRot="1" noChangeAspect="1"/>
+          </p:cNvSpPr>
+          <p:nvPr>
+            <p:ph type="sldImg"/>
+          </p:nvPr>
+        </p:nvSpPr>
+        <p:spPr/>
+      </p:sp>
+      <p:sp>
+        <p:nvSpPr>
+          <p:cNvPr id="3" name="Notes Placeholder 2"/>
+          <p:cNvSpPr>
+            <a:spLocks noGrp="1"/>
+          </p:cNvSpPr>
+          <p:nvPr>
+            <p:ph type="body" idx="1"/>
+          </p:nvPr>
+        </p:nvSpPr>
+        <p:spPr/>
+        <p:txBody>
+          <a:bodyPr/>
+          <a:lstStyle/>
+          <a:p>
+            <a:pPr marL="171450" indent="-171450">
+              <a:buFontTx/>
+              <a:buChar char="-"/>
+            </a:pPr>
+            <a:r>
+              <a:rPr lang="en-US"/>
+              <a:t>từ những yêu cầu trên</a:t>
+            </a:r>
+          </a:p>
+          <a:p>
+            <a:pPr marL="171450" indent="-171450">
+              <a:buFontTx/>
+              <a:buChar char="-"/>
+            </a:pPr>
+            <a:r>
+              <a:rPr lang="en-US"/>
+              <a:t>Bộ điều khiển gồm: vi điều khiển làm nv đọc nút, điều khiển đóng cắt, hiển thị, truyền thông</a:t>
+            </a:r>
+          </a:p>
+          <a:p>
+            <a:pPr marL="171450" indent="-171450">
+              <a:buFontTx/>
+              <a:buChar char="-"/>
+            </a:pPr>
+            <a:r>
+              <a:rPr lang="en-US"/>
+              <a:t>Ứng dụng làm nv hiển thị, gửi bản tin đk</a:t>
+            </a:r>
+            <a:endParaRPr lang="vi-VN"/>
+          </a:p>
+        </p:txBody>
+      </p:sp>
+      <p:sp>
+        <p:nvSpPr>
+          <p:cNvPr id="4" name="Slide Number Placeholder 3"/>
+          <p:cNvSpPr>
+            <a:spLocks noGrp="1"/>
+          </p:cNvSpPr>
+          <p:nvPr>
+            <p:ph type="sldNum" sz="quarter" idx="5"/>
+          </p:nvPr>
+        </p:nvSpPr>
+        <p:spPr/>
+        <p:txBody>
+          <a:bodyPr/>
+          <a:lstStyle/>
+          <a:p>
+            <a:fld id="{E2C07920-3A74-449B-970D-FA3232CC8EC0}" type="slidenum">
+              <a:rPr lang="vi-VN" smtClean="0"/>
+              <a:t>5</a:t>
+            </a:fld>
+            <a:endParaRPr lang="vi-VN"/>
+          </a:p>
+        </p:txBody>
+      </p:sp>
+    </p:spTree>
+    <p:extLst>
+      <p:ext uri="{BB962C8B-B14F-4D97-AF65-F5344CB8AC3E}">
+        <p14:creationId xmlns:p14="http://schemas.microsoft.com/office/powerpoint/2010/main" val="2893799357"/>
+      </p:ext>
+    </p:extLst>
+  </p:cSld>
+  <p:clrMapOvr>
+    <a:masterClrMapping/>
+  </p:clrMapOvr>
+</p:notes>
+</file>
+
+<file path=ppt/notesSlides/notesSlide5.xml><?xml version="1.0" encoding="utf-8"?>
+<p:notes xmlns:a="http://schemas.openxmlformats.org/drawingml/2006/main" xmlns:r="http://schemas.openxmlformats.org/officeDocument/2006/relationships" xmlns:p="http://schemas.openxmlformats.org/presentationml/2006/main">
+  <p:cSld>
+    <p:spTree>
+      <p:nvGrpSpPr>
+        <p:cNvPr id="1" name=""/>
+        <p:cNvGrpSpPr/>
+        <p:nvPr/>
+      </p:nvGrpSpPr>
+      <p:grpSpPr>
+        <a:xfrm>
+          <a:off x="0" y="0"/>
+          <a:ext cx="0" cy="0"/>
+          <a:chOff x="0" y="0"/>
+          <a:chExt cx="0" cy="0"/>
+        </a:xfrm>
+      </p:grpSpPr>
+      <p:sp>
+        <p:nvSpPr>
+          <p:cNvPr id="2" name="Slide Image Placeholder 1"/>
+          <p:cNvSpPr>
+            <a:spLocks noGrp="1" noRot="1" noChangeAspect="1"/>
+          </p:cNvSpPr>
+          <p:nvPr>
+            <p:ph type="sldImg"/>
+          </p:nvPr>
+        </p:nvSpPr>
+        <p:spPr/>
+      </p:sp>
+      <p:sp>
+        <p:nvSpPr>
+          <p:cNvPr id="3" name="Notes Placeholder 2"/>
+          <p:cNvSpPr>
+            <a:spLocks noGrp="1"/>
+          </p:cNvSpPr>
+          <p:nvPr>
+            <p:ph type="body" idx="1"/>
+          </p:nvPr>
+        </p:nvSpPr>
+        <p:spPr/>
+        <p:txBody>
+          <a:bodyPr/>
+          <a:lstStyle/>
+          <a:p>
+            <a:r>
+              <a:rPr lang="en-US"/>
+              <a:t>Lựa chọn mô đun esp8266 v12 có lõi là vđk esp8266ex. Có sẵn antenna, kết nối với wifi 2.4, có số chân gpio phù hợp</a:t>
+            </a:r>
+            <a:endParaRPr lang="vi-VN"/>
+          </a:p>
+        </p:txBody>
+      </p:sp>
+      <p:sp>
+        <p:nvSpPr>
+          <p:cNvPr id="4" name="Slide Number Placeholder 3"/>
+          <p:cNvSpPr>
+            <a:spLocks noGrp="1"/>
+          </p:cNvSpPr>
+          <p:nvPr>
+            <p:ph type="sldNum" sz="quarter" idx="5"/>
+          </p:nvPr>
+        </p:nvSpPr>
+        <p:spPr/>
+        <p:txBody>
+          <a:bodyPr/>
+          <a:lstStyle/>
+          <a:p>
+            <a:fld id="{E2C07920-3A74-449B-970D-FA3232CC8EC0}" type="slidenum">
+              <a:rPr lang="vi-VN" smtClean="0"/>
+              <a:t>6</a:t>
+            </a:fld>
+            <a:endParaRPr lang="vi-VN"/>
+          </a:p>
+        </p:txBody>
+      </p:sp>
+    </p:spTree>
+    <p:extLst>
+      <p:ext uri="{BB962C8B-B14F-4D97-AF65-F5344CB8AC3E}">
+        <p14:creationId xmlns:p14="http://schemas.microsoft.com/office/powerpoint/2010/main" val="1893162986"/>
+      </p:ext>
+    </p:extLst>
+  </p:cSld>
+  <p:clrMapOvr>
+    <a:masterClrMapping/>
+  </p:clrMapOvr>
+</p:notes>
+</file>
+
+<file path=ppt/notesSlides/notesSlide6.xml><?xml version="1.0" encoding="utf-8"?>
+<p:notes xmlns:a="http://schemas.openxmlformats.org/drawingml/2006/main" xmlns:r="http://schemas.openxmlformats.org/officeDocument/2006/relationships" xmlns:p="http://schemas.openxmlformats.org/presentationml/2006/main">
+  <p:cSld>
+    <p:spTree>
+      <p:nvGrpSpPr>
+        <p:cNvPr id="1" name=""/>
+        <p:cNvGrpSpPr/>
+        <p:nvPr/>
+      </p:nvGrpSpPr>
+      <p:grpSpPr>
+        <a:xfrm>
+          <a:off x="0" y="0"/>
+          <a:ext cx="0" cy="0"/>
+          <a:chOff x="0" y="0"/>
+          <a:chExt cx="0" cy="0"/>
+        </a:xfrm>
+      </p:grpSpPr>
+      <p:sp>
+        <p:nvSpPr>
+          <p:cNvPr id="2" name="Slide Image Placeholder 1"/>
+          <p:cNvSpPr>
+            <a:spLocks noGrp="1" noRot="1" noChangeAspect="1"/>
+          </p:cNvSpPr>
+          <p:nvPr>
+            <p:ph type="sldImg"/>
+          </p:nvPr>
+        </p:nvSpPr>
+        <p:spPr/>
+      </p:sp>
+      <p:sp>
+        <p:nvSpPr>
+          <p:cNvPr id="3" name="Notes Placeholder 2"/>
+          <p:cNvSpPr>
+            <a:spLocks noGrp="1"/>
+          </p:cNvSpPr>
+          <p:nvPr>
+            <p:ph type="body" idx="1"/>
+          </p:nvPr>
+        </p:nvSpPr>
+        <p:spPr/>
+        <p:txBody>
+          <a:bodyPr/>
+          <a:lstStyle/>
+          <a:p>
+            <a:r>
+              <a:rPr lang="en-US"/>
+              <a:t>Ở phần đóng cắt sử dụng triac: van bán dẫn cho phép dẫn dòng theo cả 2 chiều, đièu khiển thông qua xung dòng điện ở cực cổng</a:t>
+            </a:r>
+          </a:p>
+          <a:p>
+            <a:r>
+              <a:rPr lang="en-US"/>
+              <a:t>Ic lái triac: gồm 1 điốt phát quang và 1 triac với cực cổng nhạy sáng. Cho phép cách ly mạch điều khiển với mạch lực đóng cắt, nâng cao mức độ an toàn cho người sử dụng</a:t>
+            </a:r>
+            <a:endParaRPr lang="vi-VN"/>
+          </a:p>
+        </p:txBody>
+      </p:sp>
+      <p:sp>
+        <p:nvSpPr>
+          <p:cNvPr id="4" name="Slide Number Placeholder 3"/>
+          <p:cNvSpPr>
+            <a:spLocks noGrp="1"/>
+          </p:cNvSpPr>
+          <p:nvPr>
+            <p:ph type="sldNum" sz="quarter" idx="5"/>
+          </p:nvPr>
+        </p:nvSpPr>
+        <p:spPr/>
+        <p:txBody>
+          <a:bodyPr/>
+          <a:lstStyle/>
+          <a:p>
+            <a:fld id="{E2C07920-3A74-449B-970D-FA3232CC8EC0}" type="slidenum">
+              <a:rPr lang="vi-VN" smtClean="0"/>
+              <a:t>7</a:t>
+            </a:fld>
+            <a:endParaRPr lang="vi-VN"/>
+          </a:p>
+        </p:txBody>
+      </p:sp>
+    </p:spTree>
+    <p:extLst>
+      <p:ext uri="{BB962C8B-B14F-4D97-AF65-F5344CB8AC3E}">
+        <p14:creationId xmlns:p14="http://schemas.microsoft.com/office/powerpoint/2010/main" val="1355585525"/>
+      </p:ext>
+    </p:extLst>
+  </p:cSld>
+  <p:clrMapOvr>
+    <a:masterClrMapping/>
+  </p:clrMapOvr>
+</p:notes>
+</file>
+
+<file path=ppt/notesSlides/notesSlide7.xml><?xml version="1.0" encoding="utf-8"?>
+<p:notes xmlns:a="http://schemas.openxmlformats.org/drawingml/2006/main" xmlns:r="http://schemas.openxmlformats.org/officeDocument/2006/relationships" xmlns:p="http://schemas.openxmlformats.org/presentationml/2006/main">
+  <p:cSld>
+    <p:spTree>
+      <p:nvGrpSpPr>
+        <p:cNvPr id="1" name=""/>
+        <p:cNvGrpSpPr/>
+        <p:nvPr/>
+      </p:nvGrpSpPr>
+      <p:grpSpPr>
+        <a:xfrm>
+          <a:off x="0" y="0"/>
+          <a:ext cx="0" cy="0"/>
+          <a:chOff x="0" y="0"/>
+          <a:chExt cx="0" cy="0"/>
+        </a:xfrm>
+      </p:grpSpPr>
+      <p:sp>
+        <p:nvSpPr>
+          <p:cNvPr id="2" name="Slide Image Placeholder 1"/>
+          <p:cNvSpPr>
+            <a:spLocks noGrp="1" noRot="1" noChangeAspect="1"/>
+          </p:cNvSpPr>
+          <p:nvPr>
+            <p:ph type="sldImg"/>
+          </p:nvPr>
+        </p:nvSpPr>
+        <p:spPr/>
+      </p:sp>
+      <p:sp>
+        <p:nvSpPr>
+          <p:cNvPr id="3" name="Notes Placeholder 2"/>
+          <p:cNvSpPr>
+            <a:spLocks noGrp="1"/>
+          </p:cNvSpPr>
+          <p:nvPr>
+            <p:ph type="body" idx="1"/>
+          </p:nvPr>
+        </p:nvSpPr>
+        <p:spPr/>
+        <p:txBody>
+          <a:bodyPr/>
+          <a:lstStyle/>
+          <a:p>
+            <a:r>
+              <a:rPr lang="en-US"/>
+              <a:t>Để truyền thông giữa thiết bị đóng cắt và thiết bị điều khiển từ xa: dung giao thức mqtt</a:t>
+            </a:r>
+          </a:p>
+          <a:p>
+            <a:r>
+              <a:rPr lang="en-US"/>
+              <a:t>Hoạt động trên mô hình máy chủ và máy khách. Các bản tin sẽ được gửi và nhận thông qua máy chủ</a:t>
+            </a:r>
+          </a:p>
+          <a:p>
+            <a:r>
+              <a:rPr lang="en-US"/>
+              <a:t>Các máy khách nhận bản tin dựa theo topic</a:t>
+            </a:r>
+          </a:p>
+          <a:p>
+            <a:r>
+              <a:rPr lang="en-US"/>
+              <a:t>Để nhận bản tin trong 1 chủ đề, các máy khách sẽ đăng kí chủ đề đó với máy chủ</a:t>
+            </a:r>
+          </a:p>
+          <a:p>
+            <a:r>
+              <a:rPr lang="en-US"/>
+              <a:t>Để gửi bản tin trong 1 chủ đề, các máy khách sẽ xuất bản đến chủ đề đó và máy chủ sẽ phân phối bản tin tới các máy khách đã đăng kí</a:t>
+            </a:r>
+          </a:p>
+        </p:txBody>
+      </p:sp>
+      <p:sp>
+        <p:nvSpPr>
+          <p:cNvPr id="4" name="Slide Number Placeholder 3"/>
+          <p:cNvSpPr>
+            <a:spLocks noGrp="1"/>
+          </p:cNvSpPr>
+          <p:nvPr>
+            <p:ph type="sldNum" sz="quarter" idx="5"/>
+          </p:nvPr>
+        </p:nvSpPr>
+        <p:spPr/>
+        <p:txBody>
+          <a:bodyPr/>
+          <a:lstStyle/>
+          <a:p>
+            <a:fld id="{E2C07920-3A74-449B-970D-FA3232CC8EC0}" type="slidenum">
+              <a:rPr lang="vi-VN" smtClean="0"/>
+              <a:t>8</a:t>
+            </a:fld>
+            <a:endParaRPr lang="vi-VN"/>
+          </a:p>
+        </p:txBody>
+      </p:sp>
+    </p:spTree>
+    <p:extLst>
+      <p:ext uri="{BB962C8B-B14F-4D97-AF65-F5344CB8AC3E}">
+        <p14:creationId xmlns:p14="http://schemas.microsoft.com/office/powerpoint/2010/main" val="2617391368"/>
+      </p:ext>
+    </p:extLst>
+  </p:cSld>
+  <p:clrMapOvr>
+    <a:masterClrMapping/>
+  </p:clrMapOvr>
+</p:notes>
+</file>
+
+<file path=ppt/notesSlides/notesSlide8.xml><?xml version="1.0" encoding="utf-8"?>
+<p:notes xmlns:a="http://schemas.openxmlformats.org/drawingml/2006/main" xmlns:r="http://schemas.openxmlformats.org/officeDocument/2006/relationships" xmlns:p="http://schemas.openxmlformats.org/presentationml/2006/main">
+  <p:cSld>
+    <p:spTree>
+      <p:nvGrpSpPr>
+        <p:cNvPr id="1" name=""/>
+        <p:cNvGrpSpPr/>
+        <p:nvPr/>
+      </p:nvGrpSpPr>
+      <p:grpSpPr>
+        <a:xfrm>
+          <a:off x="0" y="0"/>
+          <a:ext cx="0" cy="0"/>
+          <a:chOff x="0" y="0"/>
+          <a:chExt cx="0" cy="0"/>
+        </a:xfrm>
+      </p:grpSpPr>
+      <p:sp>
+        <p:nvSpPr>
+          <p:cNvPr id="2" name="Slide Image Placeholder 1"/>
+          <p:cNvSpPr>
+            <a:spLocks noGrp="1" noRot="1" noChangeAspect="1"/>
+          </p:cNvSpPr>
+          <p:nvPr>
+            <p:ph type="sldImg"/>
+          </p:nvPr>
+        </p:nvSpPr>
+        <p:spPr/>
+      </p:sp>
+      <p:sp>
+        <p:nvSpPr>
+          <p:cNvPr id="3" name="Notes Placeholder 2"/>
+          <p:cNvSpPr>
+            <a:spLocks noGrp="1"/>
+          </p:cNvSpPr>
+          <p:nvPr>
+            <p:ph type="body" idx="1"/>
+          </p:nvPr>
+        </p:nvSpPr>
+        <p:spPr/>
+        <p:txBody>
+          <a:bodyPr/>
+          <a:lstStyle/>
+          <a:p>
+            <a:r>
+              <a:rPr lang="en-US"/>
+              <a:t>Để xây dựng ứng dụng điều khiển cho mô hình quyết định sử dụng python do em có được tiếp xúc với ngôn ngữ này khi thực tập kĩ thuật với thầy sơn kì hè vừa qua</a:t>
+            </a:r>
+          </a:p>
+          <a:p>
+            <a:r>
+              <a:rPr lang="en-US"/>
+              <a:t>Ngôn ngữ python: giới thiệu ngắn</a:t>
+            </a:r>
+          </a:p>
+          <a:p>
+            <a:r>
+              <a:rPr lang="en-US"/>
+              <a:t>Thư viện kv: cho phép xây dựng ứng dụng đa nền tảng</a:t>
+            </a:r>
+            <a:endParaRPr lang="en-US" dirty="0"/>
+          </a:p>
+        </p:txBody>
+      </p:sp>
+      <p:sp>
+        <p:nvSpPr>
+          <p:cNvPr id="4" name="Slide Number Placeholder 3"/>
+          <p:cNvSpPr>
+            <a:spLocks noGrp="1"/>
+          </p:cNvSpPr>
+          <p:nvPr>
+            <p:ph type="sldNum" sz="quarter" idx="5"/>
+          </p:nvPr>
+        </p:nvSpPr>
+        <p:spPr/>
+        <p:txBody>
+          <a:bodyPr/>
+          <a:lstStyle/>
+          <a:p>
+            <a:fld id="{E2C07920-3A74-449B-970D-FA3232CC8EC0}" type="slidenum">
+              <a:rPr lang="vi-VN" smtClean="0"/>
+              <a:t>9</a:t>
+            </a:fld>
+            <a:endParaRPr lang="vi-VN"/>
+          </a:p>
+        </p:txBody>
+      </p:sp>
+    </p:spTree>
+    <p:extLst>
+      <p:ext uri="{BB962C8B-B14F-4D97-AF65-F5344CB8AC3E}">
+        <p14:creationId xmlns:p14="http://schemas.microsoft.com/office/powerpoint/2010/main" val="4104785786"/>
+      </p:ext>
+    </p:extLst>
+  </p:cSld>
+  <p:clrMapOvr>
+    <a:masterClrMapping/>
+  </p:clrMapOvr>
+</p:notes>
+</file>
+
+<file path=ppt/notesSlides/notesSlide9.xml><?xml version="1.0" encoding="utf-8"?>
+<p:notes xmlns:a="http://schemas.openxmlformats.org/drawingml/2006/main" xmlns:r="http://schemas.openxmlformats.org/officeDocument/2006/relationships" xmlns:p="http://schemas.openxmlformats.org/presentationml/2006/main">
+  <p:cSld>
+    <p:spTree>
+      <p:nvGrpSpPr>
+        <p:cNvPr id="1" name=""/>
+        <p:cNvGrpSpPr/>
+        <p:nvPr/>
+      </p:nvGrpSpPr>
+      <p:grpSpPr>
+        <a:xfrm>
+          <a:off x="0" y="0"/>
+          <a:ext cx="0" cy="0"/>
+          <a:chOff x="0" y="0"/>
+          <a:chExt cx="0" cy="0"/>
+        </a:xfrm>
+      </p:grpSpPr>
+      <p:sp>
+        <p:nvSpPr>
+          <p:cNvPr id="2" name="Slide Image Placeholder 1"/>
+          <p:cNvSpPr>
+            <a:spLocks noGrp="1" noRot="1" noChangeAspect="1"/>
+          </p:cNvSpPr>
+          <p:nvPr>
+            <p:ph type="sldImg"/>
+          </p:nvPr>
+        </p:nvSpPr>
+        <p:spPr/>
+      </p:sp>
+      <p:sp>
+        <p:nvSpPr>
+          <p:cNvPr id="3" name="Notes Placeholder 2"/>
+          <p:cNvSpPr>
+            <a:spLocks noGrp="1"/>
+          </p:cNvSpPr>
+          <p:nvPr>
+            <p:ph type="body" idx="1"/>
+          </p:nvPr>
+        </p:nvSpPr>
+        <p:spPr/>
+        <p:txBody>
+          <a:bodyPr/>
+          <a:lstStyle/>
+          <a:p>
+            <a:endParaRPr lang="vi-VN"/>
+          </a:p>
+        </p:txBody>
+      </p:sp>
+      <p:sp>
+        <p:nvSpPr>
+          <p:cNvPr id="4" name="Slide Number Placeholder 3"/>
+          <p:cNvSpPr>
+            <a:spLocks noGrp="1"/>
+          </p:cNvSpPr>
+          <p:nvPr>
+            <p:ph type="sldNum" sz="quarter" idx="5"/>
+          </p:nvPr>
+        </p:nvSpPr>
+        <p:spPr/>
+        <p:txBody>
+          <a:bodyPr/>
+          <a:lstStyle/>
+          <a:p>
+            <a:fld id="{E2C07920-3A74-449B-970D-FA3232CC8EC0}" type="slidenum">
+              <a:rPr lang="vi-VN" smtClean="0"/>
+              <a:t>10</a:t>
+            </a:fld>
+            <a:endParaRPr lang="vi-VN"/>
+          </a:p>
+        </p:txBody>
+      </p:sp>
+    </p:spTree>
+    <p:extLst>
+      <p:ext uri="{BB962C8B-B14F-4D97-AF65-F5344CB8AC3E}">
+        <p14:creationId xmlns:p14="http://schemas.microsoft.com/office/powerpoint/2010/main" val="1436665962"/>
       </p:ext>
     </p:extLst>
   </p:cSld>
@@ -4239,7 +5395,7 @@
           <p:nvPr/>
         </p:nvPicPr>
         <p:blipFill>
-          <a:blip r:embed="rId2">
+          <a:blip r:embed="rId3">
             <a:extLst>
               <a:ext uri="{28A0092B-C50C-407E-A947-70E740481C1C}">
                 <a14:useLocalDpi xmlns:a14="http://schemas.microsoft.com/office/drawing/2010/main" val="0"/>
@@ -4803,7 +5959,7 @@
           <p:nvPr/>
         </p:nvPicPr>
         <p:blipFill>
-          <a:blip r:embed="rId2">
+          <a:blip r:embed="rId3">
             <a:extLst>
               <a:ext uri="{28A0092B-C50C-407E-A947-70E740481C1C}">
                 <a14:useLocalDpi xmlns:a14="http://schemas.microsoft.com/office/drawing/2010/main" val="0"/>
@@ -10991,7 +12147,14 @@
                 <a:latin typeface="+mn-lt"/>
                 <a:cs typeface="Times New Roman" panose="02020603050405020304" pitchFamily="18" charset="0"/>
               </a:rPr>
-              <a:t>ĐỒ ÁN TỐT NGHIỆP ĐẠI HỌC</a:t>
+              <a:t>ĐỒ ÁN </a:t>
+            </a:r>
+            <a:r>
+              <a:rPr lang="en-US" sz="3600">
+                <a:latin typeface="+mn-lt"/>
+                <a:cs typeface="Times New Roman" panose="02020603050405020304" pitchFamily="18" charset="0"/>
+              </a:rPr>
+              <a:t>TỐT NGHIỆP</a:t>
             </a:r>
             <a:br>
               <a:rPr lang="en-US" sz="3200" dirty="0">
@@ -22470,7 +23633,7 @@
           <p:nvPr/>
         </p:nvPicPr>
         <p:blipFill>
-          <a:blip r:embed="rId2">
+          <a:blip r:embed="rId3">
             <a:extLst>
               <a:ext uri="{28A0092B-C50C-407E-A947-70E740481C1C}">
                 <a14:useLocalDpi xmlns:a14="http://schemas.microsoft.com/office/drawing/2010/main" val="0"/>
@@ -23830,221 +24993,11 @@
               <a:buChar char="o"/>
             </a:pPr>
             <a:r>
-              <a:rPr lang="en-US" sz="2000" dirty="0" err="1">
-                <a:latin typeface="+mn-lt"/>
-                <a:cs typeface="Times New Roman" panose="02020603050405020304" pitchFamily="18" charset="0"/>
-              </a:rPr>
-              <a:t>Các</a:t>
-            </a:r>
-            <a:r>
-              <a:rPr lang="en-US" sz="2000" dirty="0">
-                <a:latin typeface="+mn-lt"/>
-                <a:cs typeface="Times New Roman" panose="02020603050405020304" pitchFamily="18" charset="0"/>
-              </a:rPr>
-              <a:t> </a:t>
-            </a:r>
-            <a:r>
-              <a:rPr lang="en-US" sz="2000" dirty="0" err="1">
-                <a:latin typeface="+mn-lt"/>
-                <a:cs typeface="Times New Roman" panose="02020603050405020304" pitchFamily="18" charset="0"/>
-              </a:rPr>
-              <a:t>thiết</a:t>
-            </a:r>
-            <a:r>
-              <a:rPr lang="en-US" sz="2000" dirty="0">
-                <a:latin typeface="+mn-lt"/>
-                <a:cs typeface="Times New Roman" panose="02020603050405020304" pitchFamily="18" charset="0"/>
-              </a:rPr>
-              <a:t> </a:t>
-            </a:r>
-            <a:r>
-              <a:rPr lang="en-US" sz="2000" dirty="0" err="1">
-                <a:latin typeface="+mn-lt"/>
-                <a:cs typeface="Times New Roman" panose="02020603050405020304" pitchFamily="18" charset="0"/>
-              </a:rPr>
-              <a:t>bị</a:t>
-            </a:r>
-            <a:r>
-              <a:rPr lang="en-US" sz="2000" dirty="0">
-                <a:latin typeface="+mn-lt"/>
-                <a:cs typeface="Times New Roman" panose="02020603050405020304" pitchFamily="18" charset="0"/>
-              </a:rPr>
-              <a:t> </a:t>
-            </a:r>
-            <a:r>
-              <a:rPr lang="en-US" sz="2000" dirty="0" err="1">
-                <a:latin typeface="+mn-lt"/>
-                <a:cs typeface="Times New Roman" panose="02020603050405020304" pitchFamily="18" charset="0"/>
-              </a:rPr>
-              <a:t>đóng</a:t>
-            </a:r>
-            <a:r>
-              <a:rPr lang="en-US" sz="2000" dirty="0">
-                <a:latin typeface="+mn-lt"/>
-                <a:cs typeface="Times New Roman" panose="02020603050405020304" pitchFamily="18" charset="0"/>
-              </a:rPr>
-              <a:t> </a:t>
-            </a:r>
-            <a:r>
-              <a:rPr lang="en-US" sz="2000" dirty="0" err="1">
-                <a:latin typeface="+mn-lt"/>
-                <a:cs typeface="Times New Roman" panose="02020603050405020304" pitchFamily="18" charset="0"/>
-              </a:rPr>
-              <a:t>cắt</a:t>
-            </a:r>
-            <a:r>
-              <a:rPr lang="en-US" sz="2000" dirty="0">
-                <a:latin typeface="+mn-lt"/>
-                <a:cs typeface="Times New Roman" panose="02020603050405020304" pitchFamily="18" charset="0"/>
-              </a:rPr>
-              <a:t> </a:t>
-            </a:r>
-            <a:r>
-              <a:rPr lang="en-US" sz="2000" dirty="0" err="1">
-                <a:latin typeface="+mn-lt"/>
-                <a:cs typeface="Times New Roman" panose="02020603050405020304" pitchFamily="18" charset="0"/>
-              </a:rPr>
-              <a:t>từ</a:t>
-            </a:r>
-            <a:r>
-              <a:rPr lang="en-US" sz="2000" dirty="0">
-                <a:latin typeface="+mn-lt"/>
-                <a:cs typeface="Times New Roman" panose="02020603050405020304" pitchFamily="18" charset="0"/>
-              </a:rPr>
-              <a:t> </a:t>
-            </a:r>
-            <a:r>
-              <a:rPr lang="en-US" sz="2000" dirty="0" err="1">
-                <a:latin typeface="+mn-lt"/>
-                <a:cs typeface="Times New Roman" panose="02020603050405020304" pitchFamily="18" charset="0"/>
-              </a:rPr>
-              <a:t>xa</a:t>
-            </a:r>
-            <a:r>
-              <a:rPr lang="en-US" sz="2000" dirty="0">
-                <a:latin typeface="+mn-lt"/>
-                <a:cs typeface="Times New Roman" panose="02020603050405020304" pitchFamily="18" charset="0"/>
-              </a:rPr>
-              <a:t> </a:t>
-            </a:r>
-            <a:r>
-              <a:rPr lang="en-US" sz="2000" dirty="0" err="1">
-                <a:latin typeface="+mn-lt"/>
-                <a:cs typeface="Times New Roman" panose="02020603050405020304" pitchFamily="18" charset="0"/>
-              </a:rPr>
-              <a:t>hiện</a:t>
-            </a:r>
-            <a:r>
-              <a:rPr lang="en-US" sz="2000" dirty="0">
-                <a:latin typeface="+mn-lt"/>
-                <a:cs typeface="Times New Roman" panose="02020603050405020304" pitchFamily="18" charset="0"/>
-              </a:rPr>
-              <a:t> nay </a:t>
-            </a:r>
-            <a:r>
-              <a:rPr lang="en-US" sz="2000" dirty="0" err="1">
-                <a:latin typeface="+mn-lt"/>
-                <a:cs typeface="Times New Roman" panose="02020603050405020304" pitchFamily="18" charset="0"/>
-              </a:rPr>
-              <a:t>đang</a:t>
-            </a:r>
-            <a:r>
-              <a:rPr lang="en-US" sz="2000" dirty="0">
-                <a:latin typeface="+mn-lt"/>
-                <a:cs typeface="Times New Roman" panose="02020603050405020304" pitchFamily="18" charset="0"/>
-              </a:rPr>
-              <a:t> </a:t>
-            </a:r>
-            <a:r>
-              <a:rPr lang="en-US" sz="2000" dirty="0" err="1">
-                <a:latin typeface="+mn-lt"/>
-                <a:cs typeface="Times New Roman" panose="02020603050405020304" pitchFamily="18" charset="0"/>
-              </a:rPr>
-              <a:t>sử</a:t>
-            </a:r>
-            <a:r>
-              <a:rPr lang="en-US" sz="2000" dirty="0">
-                <a:latin typeface="+mn-lt"/>
-                <a:cs typeface="Times New Roman" panose="02020603050405020304" pitchFamily="18" charset="0"/>
-              </a:rPr>
-              <a:t> </a:t>
-            </a:r>
-            <a:r>
-              <a:rPr lang="en-US" sz="2000" dirty="0" err="1">
-                <a:latin typeface="+mn-lt"/>
-                <a:cs typeface="Times New Roman" panose="02020603050405020304" pitchFamily="18" charset="0"/>
-              </a:rPr>
-              <a:t>dụng</a:t>
-            </a:r>
-            <a:r>
-              <a:rPr lang="en-US" sz="2000" dirty="0">
-                <a:latin typeface="+mn-lt"/>
-                <a:cs typeface="Times New Roman" panose="02020603050405020304" pitchFamily="18" charset="0"/>
-              </a:rPr>
-              <a:t> </a:t>
-            </a:r>
-            <a:r>
-              <a:rPr lang="en-US" sz="2000" dirty="0" err="1">
-                <a:latin typeface="+mn-lt"/>
-                <a:cs typeface="Times New Roman" panose="02020603050405020304" pitchFamily="18" charset="0"/>
-              </a:rPr>
-              <a:t>nhiều</a:t>
-            </a:r>
-            <a:r>
-              <a:rPr lang="en-US" sz="2000" dirty="0">
-                <a:latin typeface="+mn-lt"/>
-                <a:cs typeface="Times New Roman" panose="02020603050405020304" pitchFamily="18" charset="0"/>
-              </a:rPr>
-              <a:t> </a:t>
-            </a:r>
-            <a:r>
-              <a:rPr lang="en-US" sz="2000" dirty="0" err="1">
-                <a:latin typeface="+mn-lt"/>
-                <a:cs typeface="Times New Roman" panose="02020603050405020304" pitchFamily="18" charset="0"/>
-              </a:rPr>
-              <a:t>giao</a:t>
-            </a:r>
-            <a:r>
-              <a:rPr lang="en-US" sz="2000" dirty="0">
-                <a:latin typeface="+mn-lt"/>
-                <a:cs typeface="Times New Roman" panose="02020603050405020304" pitchFamily="18" charset="0"/>
-              </a:rPr>
-              <a:t> </a:t>
-            </a:r>
-            <a:r>
-              <a:rPr lang="en-US" sz="2000" dirty="0" err="1">
-                <a:latin typeface="+mn-lt"/>
-                <a:cs typeface="Times New Roman" panose="02020603050405020304" pitchFamily="18" charset="0"/>
-              </a:rPr>
-              <a:t>thức</a:t>
-            </a:r>
-            <a:r>
-              <a:rPr lang="en-US" sz="2000" dirty="0">
-                <a:latin typeface="+mn-lt"/>
-                <a:cs typeface="Times New Roman" panose="02020603050405020304" pitchFamily="18" charset="0"/>
-              </a:rPr>
-              <a:t> </a:t>
-            </a:r>
-            <a:r>
-              <a:rPr lang="en-US" sz="2000" dirty="0" err="1">
-                <a:latin typeface="+mn-lt"/>
-                <a:cs typeface="Times New Roman" panose="02020603050405020304" pitchFamily="18" charset="0"/>
-              </a:rPr>
-              <a:t>khác</a:t>
-            </a:r>
-            <a:r>
-              <a:rPr lang="en-US" sz="2000" dirty="0">
-                <a:latin typeface="+mn-lt"/>
-                <a:cs typeface="Times New Roman" panose="02020603050405020304" pitchFamily="18" charset="0"/>
-              </a:rPr>
-              <a:t> </a:t>
-            </a:r>
-            <a:r>
-              <a:rPr lang="en-US" sz="2000" dirty="0" err="1">
-                <a:latin typeface="+mn-lt"/>
-                <a:cs typeface="Times New Roman" panose="02020603050405020304" pitchFamily="18" charset="0"/>
-              </a:rPr>
-              <a:t>nhau</a:t>
+              <a:rPr lang="en-US" sz="2000">
+                <a:latin typeface="+mn-lt"/>
+                <a:cs typeface="Times New Roman" panose="02020603050405020304" pitchFamily="18" charset="0"/>
+              </a:rPr>
+              <a:t>Nhu cầu điều khiển từ xa các thiết bị điện</a:t>
             </a:r>
             <a:endParaRPr lang="en-US" sz="2000" dirty="0">
               <a:latin typeface="+mn-lt"/>
@@ -24057,102 +25010,18 @@
               <a:buChar char="o"/>
             </a:pPr>
             <a:r>
-              <a:rPr lang="en-US" sz="2000" dirty="0" err="1">
-                <a:latin typeface="+mn-lt"/>
-                <a:cs typeface="Times New Roman" panose="02020603050405020304" pitchFamily="18" charset="0"/>
-              </a:rPr>
-              <a:t>Sự</a:t>
+              <a:rPr lang="en-US" sz="2000">
+                <a:latin typeface="+mn-lt"/>
+                <a:cs typeface="Times New Roman" panose="02020603050405020304" pitchFamily="18" charset="0"/>
+              </a:rPr>
+              <a:t>Công nghệ </a:t>
             </a:r>
             <a:r>
               <a:rPr lang="en-US" sz="2000" dirty="0">
                 <a:latin typeface="+mn-lt"/>
                 <a:cs typeface="Times New Roman" panose="02020603050405020304" pitchFamily="18" charset="0"/>
               </a:rPr>
-              <a:t> </a:t>
-            </a:r>
-            <a:r>
-              <a:rPr lang="en-US" sz="2000" dirty="0" err="1">
-                <a:latin typeface="+mn-lt"/>
-                <a:cs typeface="Times New Roman" panose="02020603050405020304" pitchFamily="18" charset="0"/>
-              </a:rPr>
-              <a:t>phát</a:t>
-            </a:r>
-            <a:r>
-              <a:rPr lang="en-US" sz="2000" dirty="0">
-                <a:latin typeface="+mn-lt"/>
-                <a:cs typeface="Times New Roman" panose="02020603050405020304" pitchFamily="18" charset="0"/>
-              </a:rPr>
-              <a:t> </a:t>
-            </a:r>
-            <a:r>
-              <a:rPr lang="en-US" sz="2000" dirty="0" err="1">
-                <a:latin typeface="+mn-lt"/>
-                <a:cs typeface="Times New Roman" panose="02020603050405020304" pitchFamily="18" charset="0"/>
-              </a:rPr>
-              <a:t>triển</a:t>
-            </a:r>
-            <a:r>
-              <a:rPr lang="en-US" sz="2000" dirty="0">
-                <a:latin typeface="+mn-lt"/>
-                <a:cs typeface="Times New Roman" panose="02020603050405020304" pitchFamily="18" charset="0"/>
-              </a:rPr>
-              <a:t> </a:t>
-            </a:r>
-            <a:r>
-              <a:rPr lang="en-US" sz="2000" dirty="0" err="1">
-                <a:latin typeface="+mn-lt"/>
-                <a:cs typeface="Times New Roman" panose="02020603050405020304" pitchFamily="18" charset="0"/>
-              </a:rPr>
-              <a:t>mạnh</a:t>
-            </a:r>
-            <a:r>
-              <a:rPr lang="en-US" sz="2000" dirty="0">
-                <a:latin typeface="+mn-lt"/>
-                <a:cs typeface="Times New Roman" panose="02020603050405020304" pitchFamily="18" charset="0"/>
-              </a:rPr>
-              <a:t> </a:t>
-            </a:r>
-            <a:r>
-              <a:rPr lang="en-US" sz="2000" dirty="0" err="1">
-                <a:latin typeface="+mn-lt"/>
-                <a:cs typeface="Times New Roman" panose="02020603050405020304" pitchFamily="18" charset="0"/>
-              </a:rPr>
-              <a:t>của</a:t>
-            </a:r>
-            <a:r>
-              <a:rPr lang="en-US" sz="2000" dirty="0">
-                <a:latin typeface="+mn-lt"/>
-                <a:cs typeface="Times New Roman" panose="02020603050405020304" pitchFamily="18" charset="0"/>
-              </a:rPr>
-              <a:t> </a:t>
-            </a:r>
-            <a:r>
-              <a:rPr lang="en-US" sz="2000" dirty="0" err="1">
-                <a:latin typeface="+mn-lt"/>
-                <a:cs typeface="Times New Roman" panose="02020603050405020304" pitchFamily="18" charset="0"/>
-              </a:rPr>
-              <a:t>công</a:t>
-            </a:r>
-            <a:r>
-              <a:rPr lang="en-US" sz="2000" dirty="0">
-                <a:latin typeface="+mn-lt"/>
-                <a:cs typeface="Times New Roman" panose="02020603050405020304" pitchFamily="18" charset="0"/>
-              </a:rPr>
-              <a:t> </a:t>
-            </a:r>
-            <a:r>
-              <a:rPr lang="en-US" sz="2000" dirty="0" err="1">
-                <a:latin typeface="+mn-lt"/>
-                <a:cs typeface="Times New Roman" panose="02020603050405020304" pitchFamily="18" charset="0"/>
-              </a:rPr>
-              <a:t>nghệ</a:t>
-            </a:r>
-            <a:r>
-              <a:rPr lang="en-US" sz="2000" dirty="0">
-                <a:latin typeface="+mn-lt"/>
-                <a:cs typeface="Times New Roman" panose="02020603050405020304" pitchFamily="18" charset="0"/>
-              </a:rPr>
-              <a:t> Internet </a:t>
+              <a:t>Internet </a:t>
             </a:r>
             <a:r>
               <a:rPr lang="en-US" sz="2000" dirty="0" err="1">
@@ -24977,7 +25846,7 @@
           <p:nvPr/>
         </p:nvPicPr>
         <p:blipFill>
-          <a:blip r:embed="rId2">
+          <a:blip r:embed="rId3">
             <a:extLst>
               <a:ext uri="{28A0092B-C50C-407E-A947-70E740481C1C}">
                 <a14:useLocalDpi xmlns:a14="http://schemas.microsoft.com/office/drawing/2010/main" val="0"/>
@@ -25367,36 +26236,6 @@
           </a:p>
         </p:txBody>
       </p:sp>
-      <p:pic>
-        <p:nvPicPr>
-          <p:cNvPr id="6" name="Picture 5">
-            <a:extLst>
-              <a:ext uri="{FF2B5EF4-FFF2-40B4-BE49-F238E27FC236}">
-                <a16:creationId xmlns:a16="http://schemas.microsoft.com/office/drawing/2014/main" id="{9E329CBE-7AA0-4A3D-9D5F-600EF1EF21BF}"/>
-              </a:ext>
-            </a:extLst>
-          </p:cNvPr>
-          <p:cNvPicPr>
-            <a:picLocks noChangeAspect="1"/>
-          </p:cNvPicPr>
-          <p:nvPr/>
-        </p:nvPicPr>
-        <p:blipFill>
-          <a:blip r:embed="rId2"/>
-          <a:stretch>
-            <a:fillRect/>
-          </a:stretch>
-        </p:blipFill>
-        <p:spPr>
-          <a:xfrm>
-            <a:off x="1210508" y="1534185"/>
-            <a:ext cx="9770983" cy="3789630"/>
-          </a:xfrm>
-          <a:prstGeom prst="rect">
-            <a:avLst/>
-          </a:prstGeom>
-        </p:spPr>
-      </p:pic>
       <p:sp>
         <p:nvSpPr>
           <p:cNvPr id="8" name="Text Placeholder 2">
@@ -25605,6 +26444,36 @@
           </a:p>
         </p:txBody>
       </p:sp>
+      <p:pic>
+        <p:nvPicPr>
+          <p:cNvPr id="17" name="Picture 16">
+            <a:extLst>
+              <a:ext uri="{FF2B5EF4-FFF2-40B4-BE49-F238E27FC236}">
+                <a16:creationId xmlns:a16="http://schemas.microsoft.com/office/drawing/2014/main" id="{B7817C18-37D0-4894-B002-F5155F946CED}"/>
+              </a:ext>
+            </a:extLst>
+          </p:cNvPr>
+          <p:cNvPicPr>
+            <a:picLocks noChangeAspect="1"/>
+          </p:cNvPicPr>
+          <p:nvPr/>
+        </p:nvPicPr>
+        <p:blipFill>
+          <a:blip r:embed="rId3"/>
+          <a:stretch>
+            <a:fillRect/>
+          </a:stretch>
+        </p:blipFill>
+        <p:spPr>
+          <a:xfrm>
+            <a:off x="828675" y="1498868"/>
+            <a:ext cx="10534650" cy="4029075"/>
+          </a:xfrm>
+          <a:prstGeom prst="rect">
+            <a:avLst/>
+          </a:prstGeom>
+        </p:spPr>
+      </p:pic>
     </p:spTree>
     <p:extLst>
       <p:ext uri="{BB962C8B-B14F-4D97-AF65-F5344CB8AC3E}">
@@ -25669,7 +26538,7 @@
                 <a:latin typeface="+mn-lt"/>
                 <a:cs typeface="Times New Roman" panose="02020603050405020304" pitchFamily="18" charset="0"/>
               </a:rPr>
-              <a:t>Mô-đun ESP8266</a:t>
+              <a:t>Mô-đun ESP8266 V12</a:t>
             </a:r>
             <a:endParaRPr lang="en-US" dirty="0">
               <a:latin typeface="+mn-lt"/>
@@ -25968,7 +26837,7 @@
           <p:nvPr/>
         </p:nvPicPr>
         <p:blipFill rotWithShape="1">
-          <a:blip r:embed="rId2" cstate="print">
+          <a:blip r:embed="rId3" cstate="print">
             <a:extLst>
               <a:ext uri="{28A0092B-C50C-407E-A947-70E740481C1C}">
                 <a14:useLocalDpi xmlns:a14="http://schemas.microsoft.com/office/drawing/2010/main" val="0"/>
@@ -26265,19 +27134,16 @@
               <a:buNone/>
             </a:pPr>
             <a:r>
-              <a:rPr lang="en-US" sz="3200" dirty="0" err="1">
-                <a:latin typeface="+mn-lt"/>
-                <a:cs typeface="Times New Roman" panose="02020603050405020304" pitchFamily="18" charset="0"/>
-              </a:rPr>
-              <a:t>Triac</a:t>
-            </a:r>
-            <a:r>
-              <a:rPr lang="en-US" sz="3200" dirty="0">
-                <a:latin typeface="+mn-lt"/>
-                <a:cs typeface="Times New Roman" panose="02020603050405020304" pitchFamily="18" charset="0"/>
-              </a:rPr>
-              <a:t>:</a:t>
-            </a:r>
+              <a:rPr lang="en-US" sz="3200">
+                <a:latin typeface="+mn-lt"/>
+                <a:cs typeface="Times New Roman" panose="02020603050405020304" pitchFamily="18" charset="0"/>
+              </a:rPr>
+              <a:t>Triac – BTA24:</a:t>
+            </a:r>
+            <a:endParaRPr lang="en-US" sz="3200" dirty="0">
+              <a:latin typeface="+mn-lt"/>
+              <a:cs typeface="Times New Roman" panose="02020603050405020304" pitchFamily="18" charset="0"/>
+            </a:endParaRPr>
           </a:p>
           <a:p>
             <a:r>
@@ -26457,7 +27323,7 @@
           <p:nvPr/>
         </p:nvPicPr>
         <p:blipFill>
-          <a:blip r:embed="rId2">
+          <a:blip r:embed="rId3">
             <a:extLst>
               <a:ext uri="{28A0092B-C50C-407E-A947-70E740481C1C}">
                 <a14:useLocalDpi xmlns:a14="http://schemas.microsoft.com/office/drawing/2010/main" val="0"/>
@@ -26471,8 +27337,8 @@
         </p:blipFill>
         <p:spPr bwMode="auto">
           <a:xfrm>
-            <a:off x="7146022" y="1058844"/>
-            <a:ext cx="3209833" cy="2567868"/>
+            <a:off x="6641823" y="1058844"/>
+            <a:ext cx="3828262" cy="3062611"/>
           </a:xfrm>
           <a:prstGeom prst="rect">
             <a:avLst/>
@@ -26712,7 +27578,7 @@
           <p:nvPr/>
         </p:nvPicPr>
         <p:blipFill>
-          <a:blip r:embed="rId3">
+          <a:blip r:embed="rId4">
             <a:extLst>
               <a:ext uri="{28A0092B-C50C-407E-A947-70E740481C1C}">
                 <a14:useLocalDpi xmlns:a14="http://schemas.microsoft.com/office/drawing/2010/main" val="0"/>
@@ -26804,46 +27670,11 @@
               <a:buNone/>
             </a:pPr>
             <a:r>
-              <a:rPr lang="en-US" dirty="0" err="1">
-                <a:latin typeface="+mn-lt"/>
-                <a:cs typeface="Times New Roman" panose="02020603050405020304" pitchFamily="18" charset="0"/>
-              </a:rPr>
-              <a:t>Giới</a:t>
-            </a:r>
-            <a:r>
-              <a:rPr lang="en-US" dirty="0">
-                <a:latin typeface="+mn-lt"/>
-                <a:cs typeface="Times New Roman" panose="02020603050405020304" pitchFamily="18" charset="0"/>
-              </a:rPr>
-              <a:t> </a:t>
-            </a:r>
-            <a:r>
-              <a:rPr lang="en-US" dirty="0" err="1">
-                <a:latin typeface="+mn-lt"/>
-                <a:cs typeface="Times New Roman" panose="02020603050405020304" pitchFamily="18" charset="0"/>
-              </a:rPr>
-              <a:t>thiệu</a:t>
-            </a:r>
-            <a:r>
-              <a:rPr lang="en-US" dirty="0">
-                <a:latin typeface="+mn-lt"/>
-                <a:cs typeface="Times New Roman" panose="02020603050405020304" pitchFamily="18" charset="0"/>
-              </a:rPr>
-              <a:t> </a:t>
-            </a:r>
-            <a:r>
-              <a:rPr lang="en-US" dirty="0" err="1">
-                <a:latin typeface="+mn-lt"/>
-                <a:cs typeface="Times New Roman" panose="02020603050405020304" pitchFamily="18" charset="0"/>
-              </a:rPr>
-              <a:t>giao</a:t>
-            </a:r>
-            <a:r>
-              <a:rPr lang="en-US" dirty="0">
-                <a:latin typeface="+mn-lt"/>
-                <a:cs typeface="Times New Roman" panose="02020603050405020304" pitchFamily="18" charset="0"/>
-              </a:rPr>
-              <a:t> </a:t>
+              <a:rPr lang="en-US">
+                <a:latin typeface="+mn-lt"/>
+                <a:cs typeface="Times New Roman" panose="02020603050405020304" pitchFamily="18" charset="0"/>
+              </a:rPr>
+              <a:t>Giao </a:t>
             </a:r>
             <a:r>
               <a:rPr lang="en-US" dirty="0" err="1">
@@ -27143,7 +27974,7 @@
           <p:nvPr/>
         </p:nvPicPr>
         <p:blipFill>
-          <a:blip r:embed="rId2"/>
+          <a:blip r:embed="rId3"/>
           <a:stretch>
             <a:fillRect/>
           </a:stretch>
@@ -28477,6 +29308,12 @@
 </file>
 
 <file path=customXml/item1.xml><?xml version="1.0" encoding="utf-8"?>
+<p:properties xmlns:p="http://schemas.microsoft.com/office/2006/metadata/properties" xmlns:xsi="http://www.w3.org/2001/XMLSchema-instance" xmlns:pc="http://schemas.microsoft.com/office/infopath/2007/PartnerControls">
+  <documentManagement/>
+</p:properties>
+</file>
+
+<file path=customXml/item2.xml><?xml version="1.0" encoding="utf-8"?>
 <ct:contentTypeSchema xmlns:ct="http://schemas.microsoft.com/office/2006/metadata/contentType" xmlns:ma="http://schemas.microsoft.com/office/2006/metadata/properties/metaAttributes" ct:_="" ma:_="" ma:contentTypeName="Document" ma:contentTypeID="0x01010029FB87B201BB164AA8F0D7E07FC18253" ma:contentTypeVersion="12" ma:contentTypeDescription="Create a new document." ma:contentTypeScope="" ma:versionID="ec75d641dd128f4ad30853614c3b4998">
   <xsd:schema xmlns:xsd="http://www.w3.org/2001/XMLSchema" xmlns:xs="http://www.w3.org/2001/XMLSchema" xmlns:p="http://schemas.microsoft.com/office/2006/metadata/properties" xmlns:ns2="c070d92c-e005-4177-a1a8-b2208be38bba" xmlns:ns3="c72df4cc-d2de-4b7e-8388-06b9b73bb217" targetNamespace="http://schemas.microsoft.com/office/2006/metadata/properties" ma:root="true" ma:fieldsID="0bd5079f3866d8fa0d2cfeac6b7a2082" ns2:_="" ns3:_="">
     <xsd:import namespace="c070d92c-e005-4177-a1a8-b2208be38bba"/>
@@ -28693,12 +29530,6 @@
 </ct:contentTypeSchema>
 </file>
 
-<file path=customXml/item2.xml><?xml version="1.0" encoding="utf-8"?>
-<p:properties xmlns:p="http://schemas.microsoft.com/office/2006/metadata/properties" xmlns:xsi="http://www.w3.org/2001/XMLSchema-instance" xmlns:pc="http://schemas.microsoft.com/office/infopath/2007/PartnerControls">
-  <documentManagement/>
-</p:properties>
-</file>
-
 <file path=customXml/item3.xml><?xml version="1.0" encoding="utf-8"?>
 <?mso-contentType ?>
 <FormTemplates xmlns="http://schemas.microsoft.com/sharepoint/v3/contenttype/forms">
@@ -28709,6 +29540,15 @@
 </file>
 
 <file path=customXml/itemProps1.xml><?xml version="1.0" encoding="utf-8"?>
+<ds:datastoreItem xmlns:ds="http://schemas.openxmlformats.org/officeDocument/2006/customXml" ds:itemID="{5666771F-238C-409E-B1DF-70481BFDE8AE}">
+  <ds:schemaRefs>
+    <ds:schemaRef ds:uri="http://schemas.microsoft.com/office/2006/metadata/properties"/>
+    <ds:schemaRef ds:uri="http://schemas.microsoft.com/office/infopath/2007/PartnerControls"/>
+  </ds:schemaRefs>
+</ds:datastoreItem>
+</file>
+
+<file path=customXml/itemProps2.xml><?xml version="1.0" encoding="utf-8"?>
 <ds:datastoreItem xmlns:ds="http://schemas.openxmlformats.org/officeDocument/2006/customXml" ds:itemID="{D2294227-C537-4C56-90F1-0A24B92707E6}">
   <ds:schemaRefs>
     <ds:schemaRef ds:uri="http://schemas.microsoft.com/office/2006/metadata/contentType"/>
@@ -28727,15 +29567,6 @@
 </ds:datastoreItem>
 </file>
 
-<file path=customXml/itemProps2.xml><?xml version="1.0" encoding="utf-8"?>
-<ds:datastoreItem xmlns:ds="http://schemas.openxmlformats.org/officeDocument/2006/customXml" ds:itemID="{5666771F-238C-409E-B1DF-70481BFDE8AE}">
-  <ds:schemaRefs>
-    <ds:schemaRef ds:uri="http://schemas.microsoft.com/office/2006/metadata/properties"/>
-    <ds:schemaRef ds:uri="http://schemas.microsoft.com/office/infopath/2007/PartnerControls"/>
-  </ds:schemaRefs>
-</ds:datastoreItem>
-</file>
-
 <file path=customXml/itemProps3.xml><?xml version="1.0" encoding="utf-8"?>
 <ds:datastoreItem xmlns:ds="http://schemas.openxmlformats.org/officeDocument/2006/customXml" ds:itemID="{69128D4C-6F8B-42B2-A3A4-DC1405FCC7A7}">
   <ds:schemaRefs>

</xml_diff>